<commit_message>
adds sources / links
</commit_message>
<xml_diff>
--- a/bitwise.pptx
+++ b/bitwise.pptx
@@ -235,7 +235,7 @@
           <a:p>
             <a:fld id="{9A58CB77-92F1-7E47-9DA4-9DD8C61ED589}" type="datetimeFigureOut">
               <a:rPr lang="en-US" smtClean="0"/>
-              <a:t>12/11/18</a:t>
+              <a:t>12/12/18</a:t>
             </a:fld>
             <a:endParaRPr lang="en-US"/>
           </a:p>
@@ -7434,7 +7434,7 @@
           <a:p>
             <a:fld id="{ADEDE260-A783-9B44-98B4-E452A64D1D1F}" type="datetimeFigureOut">
               <a:rPr lang="en-US" smtClean="0"/>
-              <a:t>12/11/18</a:t>
+              <a:t>12/12/18</a:t>
             </a:fld>
             <a:endParaRPr lang="en-US"/>
           </a:p>
@@ -7632,7 +7632,7 @@
           <a:p>
             <a:fld id="{ADEDE260-A783-9B44-98B4-E452A64D1D1F}" type="datetimeFigureOut">
               <a:rPr lang="en-US" smtClean="0"/>
-              <a:t>12/11/18</a:t>
+              <a:t>12/12/18</a:t>
             </a:fld>
             <a:endParaRPr lang="en-US"/>
           </a:p>
@@ -7840,7 +7840,7 @@
           <a:p>
             <a:fld id="{ADEDE260-A783-9B44-98B4-E452A64D1D1F}" type="datetimeFigureOut">
               <a:rPr lang="en-US" smtClean="0"/>
-              <a:t>12/11/18</a:t>
+              <a:t>12/12/18</a:t>
             </a:fld>
             <a:endParaRPr lang="en-US"/>
           </a:p>
@@ -8038,7 +8038,7 @@
           <a:p>
             <a:fld id="{ADEDE260-A783-9B44-98B4-E452A64D1D1F}" type="datetimeFigureOut">
               <a:rPr lang="en-US" smtClean="0"/>
-              <a:t>12/11/18</a:t>
+              <a:t>12/12/18</a:t>
             </a:fld>
             <a:endParaRPr lang="en-US"/>
           </a:p>
@@ -8313,7 +8313,7 @@
           <a:p>
             <a:fld id="{ADEDE260-A783-9B44-98B4-E452A64D1D1F}" type="datetimeFigureOut">
               <a:rPr lang="en-US" smtClean="0"/>
-              <a:t>12/11/18</a:t>
+              <a:t>12/12/18</a:t>
             </a:fld>
             <a:endParaRPr lang="en-US"/>
           </a:p>
@@ -8578,7 +8578,7 @@
           <a:p>
             <a:fld id="{ADEDE260-A783-9B44-98B4-E452A64D1D1F}" type="datetimeFigureOut">
               <a:rPr lang="en-US" smtClean="0"/>
-              <a:t>12/11/18</a:t>
+              <a:t>12/12/18</a:t>
             </a:fld>
             <a:endParaRPr lang="en-US"/>
           </a:p>
@@ -8990,7 +8990,7 @@
           <a:p>
             <a:fld id="{ADEDE260-A783-9B44-98B4-E452A64D1D1F}" type="datetimeFigureOut">
               <a:rPr lang="en-US" smtClean="0"/>
-              <a:t>12/11/18</a:t>
+              <a:t>12/12/18</a:t>
             </a:fld>
             <a:endParaRPr lang="en-US"/>
           </a:p>
@@ -9131,7 +9131,7 @@
           <a:p>
             <a:fld id="{ADEDE260-A783-9B44-98B4-E452A64D1D1F}" type="datetimeFigureOut">
               <a:rPr lang="en-US" smtClean="0"/>
-              <a:t>12/11/18</a:t>
+              <a:t>12/12/18</a:t>
             </a:fld>
             <a:endParaRPr lang="en-US"/>
           </a:p>
@@ -9244,7 +9244,7 @@
           <a:p>
             <a:fld id="{ADEDE260-A783-9B44-98B4-E452A64D1D1F}" type="datetimeFigureOut">
               <a:rPr lang="en-US" smtClean="0"/>
-              <a:t>12/11/18</a:t>
+              <a:t>12/12/18</a:t>
             </a:fld>
             <a:endParaRPr lang="en-US"/>
           </a:p>
@@ -9555,7 +9555,7 @@
           <a:p>
             <a:fld id="{ADEDE260-A783-9B44-98B4-E452A64D1D1F}" type="datetimeFigureOut">
               <a:rPr lang="en-US" smtClean="0"/>
-              <a:t>12/11/18</a:t>
+              <a:t>12/12/18</a:t>
             </a:fld>
             <a:endParaRPr lang="en-US"/>
           </a:p>
@@ -9843,7 +9843,7 @@
           <a:p>
             <a:fld id="{ADEDE260-A783-9B44-98B4-E452A64D1D1F}" type="datetimeFigureOut">
               <a:rPr lang="en-US" smtClean="0"/>
-              <a:t>12/11/18</a:t>
+              <a:t>12/12/18</a:t>
             </a:fld>
             <a:endParaRPr lang="en-US"/>
           </a:p>
@@ -10084,7 +10084,7 @@
           <a:p>
             <a:fld id="{ADEDE260-A783-9B44-98B4-E452A64D1D1F}" type="datetimeFigureOut">
               <a:rPr lang="en-US" smtClean="0"/>
-              <a:t>12/11/18</a:t>
+              <a:t>12/12/18</a:t>
             </a:fld>
             <a:endParaRPr lang="en-US"/>
           </a:p>
@@ -22436,19 +22436,47 @@
         </p:nvSpPr>
         <p:spPr/>
         <p:txBody>
-          <a:bodyPr/>
+          <a:bodyPr>
+            <a:normAutofit fontScale="92500" lnSpcReduction="10000"/>
+          </a:bodyPr>
           <a:lstStyle/>
           <a:p>
             <a:r>
               <a:rPr lang="en-US" dirty="0"/>
               <a:t>Wikipedia page on Bitwise Operations:</a:t>
             </a:r>
+            <a:br>
+              <a:rPr lang="en-US" dirty="0"/>
+            </a:br>
+            <a:r>
+              <a:rPr lang="en-US" dirty="0">
+                <a:hlinkClick r:id="rId3"/>
+              </a:rPr>
+              <a:t>https://en.wikipedia.org/wiki/Bitwise_operation</a:t>
+            </a:r>
+            <a:r>
+              <a:rPr lang="en-US" dirty="0"/>
+              <a:t> </a:t>
+            </a:r>
           </a:p>
           <a:p>
             <a:r>
               <a:rPr lang="en-US" dirty="0"/>
               <a:t>ECMA-262 section on bitwise operations:</a:t>
             </a:r>
+            <a:br>
+              <a:rPr lang="en-US" dirty="0"/>
+            </a:br>
+            <a:r>
+              <a:rPr lang="en-US" dirty="0">
+                <a:hlinkClick r:id="rId4"/>
+              </a:rPr>
+              <a:t>https://www.ecma-international.org/ecma-262/9.0/index.html#sec-binary-bitwise-operators-runtime-semantics-evaluation</a:t>
+            </a:r>
+            <a:r>
+              <a:rPr lang="en-US" dirty="0"/>
+              <a:t> </a:t>
+            </a:r>
           </a:p>
           <a:p>
             <a:r>
@@ -22461,11 +22489,14 @@
             </a:r>
             <a:r>
               <a:rPr lang="en-US" dirty="0"/>
-              <a:t> tutorial on Bitwise Operations: </a:t>
-            </a:r>
+              <a:t> tutorial on Bitwise Operations</a:t>
+            </a:r>
+            <a:br>
+              <a:rPr lang="en-US" dirty="0"/>
+            </a:br>
             <a:r>
               <a:rPr lang="en-US" dirty="0">
-                <a:hlinkClick r:id="rId3"/>
+                <a:hlinkClick r:id="rId5"/>
               </a:rPr>
               <a:t>https://www.youtube.com/watch?v=NLKQEOgBAnw</a:t>
             </a:r>
@@ -22485,11 +22516,14 @@
             </a:r>
             <a:r>
               <a:rPr lang="en-US" dirty="0"/>
-              <a:t>: </a:t>
-            </a:r>
+              <a:t>:</a:t>
+            </a:r>
+            <a:br>
+              <a:rPr lang="en-US" dirty="0"/>
+            </a:br>
             <a:r>
               <a:rPr lang="en-US" dirty="0">
-                <a:hlinkClick r:id="rId4"/>
+                <a:hlinkClick r:id="rId6"/>
               </a:rPr>
               <a:t>https://github.com/daprahamian</a:t>
             </a:r>
@@ -22498,8 +22532,24 @@
           <a:p>
             <a:r>
               <a:rPr lang="en-US" dirty="0"/>
-              <a:t>Links to Slides: &lt;&gt;</a:t>
-            </a:r>
+              <a:t>Links to Slides:</a:t>
+            </a:r>
+            <a:br>
+              <a:rPr lang="en-US" dirty="0"/>
+            </a:br>
+            <a:r>
+              <a:rPr lang="en-US" dirty="0">
+                <a:hlinkClick r:id="rId7"/>
+              </a:rPr>
+              <a:t>https://github.com/daprahamian/bitwise-operations</a:t>
+            </a:r>
+            <a:endParaRPr lang="en-US" dirty="0"/>
+          </a:p>
+          <a:p>
+            <a:pPr marL="0" indent="0">
+              <a:buNone/>
+            </a:pPr>
+            <a:endParaRPr lang="en-US" dirty="0"/>
           </a:p>
         </p:txBody>
       </p:sp>

</xml_diff>